<commit_message>
Moved lifecycle after Promise. Minor pptx edits.
</commit_message>
<xml_diff>
--- a/06 HTTP.pptx
+++ b/06 HTTP.pptx
@@ -127,7 +127,7 @@
 <file path=ppt/revisionInfo.xml><?xml version="1.0" encoding="utf-8"?>
 <p1510:revInfo xmlns:a="http://schemas.openxmlformats.org/drawingml/2006/main" xmlns:r="http://schemas.openxmlformats.org/officeDocument/2006/relationships" xmlns:p1510="http://schemas.microsoft.com/office/powerpoint/2015/10/main">
   <p1510:revLst>
-    <p1510:client id="{65DA8E03-7504-0749-AD15-1C6C56F8C6BC}" v="11" dt="2020-09-09T03:54:06.904"/>
+    <p1510:client id="{9076B359-1C47-4D50-A316-51C2EA28ABC6}" v="2" dt="2020-09-14T13:36:13.026"/>
   </p1510:revLst>
 </p1510:revInfo>
 </file>
@@ -339,6 +339,75 @@
       </pc:sldChg>
     </pc:docChg>
   </pc:docChgLst>
+  <pc:docChgLst>
+    <pc:chgData name="Gregory, Tom" userId="689e05cb-58fe-4f6b-9bd6-2e068b7d12bc" providerId="ADAL" clId="{9076B359-1C47-4D50-A316-51C2EA28ABC6}"/>
+    <pc:docChg chg="undo custSel modSld">
+      <pc:chgData name="Gregory, Tom" userId="689e05cb-58fe-4f6b-9bd6-2e068b7d12bc" providerId="ADAL" clId="{9076B359-1C47-4D50-A316-51C2EA28ABC6}" dt="2020-09-14T13:36:13.026" v="18" actId="20578"/>
+      <pc:docMkLst>
+        <pc:docMk/>
+      </pc:docMkLst>
+      <pc:sldChg chg="modSp mod">
+        <pc:chgData name="Gregory, Tom" userId="689e05cb-58fe-4f6b-9bd6-2e068b7d12bc" providerId="ADAL" clId="{9076B359-1C47-4D50-A316-51C2EA28ABC6}" dt="2020-09-14T12:24:59.330" v="3" actId="20577"/>
+        <pc:sldMkLst>
+          <pc:docMk/>
+          <pc:sldMk cId="512110358" sldId="259"/>
+        </pc:sldMkLst>
+        <pc:spChg chg="mod">
+          <ac:chgData name="Gregory, Tom" userId="689e05cb-58fe-4f6b-9bd6-2e068b7d12bc" providerId="ADAL" clId="{9076B359-1C47-4D50-A316-51C2EA28ABC6}" dt="2020-09-14T12:24:59.330" v="3" actId="20577"/>
+          <ac:spMkLst>
+            <pc:docMk/>
+            <pc:sldMk cId="512110358" sldId="259"/>
+            <ac:spMk id="3" creationId="{00000000-0000-0000-0000-000000000000}"/>
+          </ac:spMkLst>
+        </pc:spChg>
+      </pc:sldChg>
+      <pc:sldChg chg="modSp mod">
+        <pc:chgData name="Gregory, Tom" userId="689e05cb-58fe-4f6b-9bd6-2e068b7d12bc" providerId="ADAL" clId="{9076B359-1C47-4D50-A316-51C2EA28ABC6}" dt="2020-09-14T13:28:38.288" v="5" actId="20577"/>
+        <pc:sldMkLst>
+          <pc:docMk/>
+          <pc:sldMk cId="575034114" sldId="263"/>
+        </pc:sldMkLst>
+        <pc:spChg chg="mod">
+          <ac:chgData name="Gregory, Tom" userId="689e05cb-58fe-4f6b-9bd6-2e068b7d12bc" providerId="ADAL" clId="{9076B359-1C47-4D50-A316-51C2EA28ABC6}" dt="2020-09-14T13:28:38.288" v="5" actId="20577"/>
+          <ac:spMkLst>
+            <pc:docMk/>
+            <pc:sldMk cId="575034114" sldId="263"/>
+            <ac:spMk id="5" creationId="{00000000-0000-0000-0000-000000000000}"/>
+          </ac:spMkLst>
+        </pc:spChg>
+      </pc:sldChg>
+      <pc:sldChg chg="modSp mod">
+        <pc:chgData name="Gregory, Tom" userId="689e05cb-58fe-4f6b-9bd6-2e068b7d12bc" providerId="ADAL" clId="{9076B359-1C47-4D50-A316-51C2EA28ABC6}" dt="2020-09-14T13:32:47.089" v="14" actId="20577"/>
+        <pc:sldMkLst>
+          <pc:docMk/>
+          <pc:sldMk cId="607446001" sldId="264"/>
+        </pc:sldMkLst>
+        <pc:spChg chg="mod">
+          <ac:chgData name="Gregory, Tom" userId="689e05cb-58fe-4f6b-9bd6-2e068b7d12bc" providerId="ADAL" clId="{9076B359-1C47-4D50-A316-51C2EA28ABC6}" dt="2020-09-14T13:32:47.089" v="14" actId="20577"/>
+          <ac:spMkLst>
+            <pc:docMk/>
+            <pc:sldMk cId="607446001" sldId="264"/>
+            <ac:spMk id="18" creationId="{00000000-0000-0000-0000-000000000000}"/>
+          </ac:spMkLst>
+        </pc:spChg>
+      </pc:sldChg>
+      <pc:sldChg chg="modSp mod">
+        <pc:chgData name="Gregory, Tom" userId="689e05cb-58fe-4f6b-9bd6-2e068b7d12bc" providerId="ADAL" clId="{9076B359-1C47-4D50-A316-51C2EA28ABC6}" dt="2020-09-14T13:36:13.026" v="18" actId="20578"/>
+        <pc:sldMkLst>
+          <pc:docMk/>
+          <pc:sldMk cId="1657585799" sldId="265"/>
+        </pc:sldMkLst>
+        <pc:spChg chg="mod">
+          <ac:chgData name="Gregory, Tom" userId="689e05cb-58fe-4f6b-9bd6-2e068b7d12bc" providerId="ADAL" clId="{9076B359-1C47-4D50-A316-51C2EA28ABC6}" dt="2020-09-14T13:36:13.026" v="18" actId="20578"/>
+          <ac:spMkLst>
+            <pc:docMk/>
+            <pc:sldMk cId="1657585799" sldId="265"/>
+            <ac:spMk id="5" creationId="{00000000-0000-0000-0000-000000000000}"/>
+          </ac:spMkLst>
+        </pc:spChg>
+      </pc:sldChg>
+    </pc:docChg>
+  </pc:docChgLst>
 </pc:chgInfo>
 </file>
 
@@ -424,7 +493,7 @@
           <a:p>
             <a:fld id="{DA8B982A-3B62-B242-B78C-6F4309AD2A69}" type="datetimeFigureOut">
               <a:rPr lang="en-US" smtClean="0"/>
-              <a:t>9/8/20</a:t>
+              <a:t>9/14/2020</a:t>
             </a:fld>
             <a:endParaRPr lang="en-US"/>
           </a:p>
@@ -3377,7 +3446,7 @@
           <a:p>
             <a:r>
               <a:rPr lang="en-US" sz="2800" dirty="0"/>
-              <a:t>Fall 2019</a:t>
+              <a:t>Fall 2020</a:t>
             </a:r>
           </a:p>
         </p:txBody>
@@ -4503,7 +4572,7 @@
         <p:spPr>
           <a:xfrm>
             <a:off x="1351598" y="2735637"/>
-            <a:ext cx="9302547" cy="646331"/>
+            <a:ext cx="9555821" cy="646331"/>
           </a:xfrm>
           <a:prstGeom prst="rect">
             <a:avLst/>
@@ -4522,29 +4591,8 @@
                 <a:ea typeface="Consolas" charset="0"/>
                 <a:cs typeface="Consolas" charset="0"/>
               </a:rPr>
-              <a:t>http</a:t>
-            </a:r>
-            <a:r>
-              <a:rPr lang="en-US" sz="3600">
-                <a:latin typeface="Consolas" charset="0"/>
-                <a:ea typeface="Consolas" charset="0"/>
-                <a:cs typeface="Consolas" charset="0"/>
-              </a:rPr>
-              <a:t>://www.example.com:80/</a:t>
-            </a:r>
-            <a:r>
-              <a:rPr lang="en-US" sz="3600" dirty="0" err="1">
-                <a:latin typeface="Consolas" charset="0"/>
-                <a:ea typeface="Consolas" charset="0"/>
-                <a:cs typeface="Consolas" charset="0"/>
-              </a:rPr>
-              <a:t>index.html</a:t>
-            </a:r>
-            <a:endParaRPr lang="en-US" sz="3600" dirty="0">
-              <a:latin typeface="Consolas" charset="0"/>
-              <a:ea typeface="Consolas" charset="0"/>
-              <a:cs typeface="Consolas" charset="0"/>
-            </a:endParaRPr>
+              <a:t>http://www.example.com:80/index.html</a:t>
+            </a:r>
           </a:p>
         </p:txBody>
       </p:sp>
@@ -5818,10 +5866,9 @@
               <a:rPr lang="en-US" sz="2400" dirty="0"/>
             </a:br>
             <a:r>
-              <a:rPr lang="en-US" sz="2400"/>
+              <a:rPr lang="en-US" sz="2400" dirty="0"/>
               <a:t>application server.</a:t>
             </a:r>
-            <a:endParaRPr lang="en-US" sz="2400" dirty="0"/>
           </a:p>
         </p:txBody>
       </p:sp>
@@ -6380,7 +6427,7 @@
                     <a:schemeClr val="bg1"/>
                   </a:solidFill>
                 </a:rPr>
-                <a:t>Internet</a:t>
+                <a:t>Network</a:t>
               </a:r>
             </a:p>
           </p:txBody>
@@ -6673,23 +6720,7 @@
                 <a:ea typeface="Consolas" charset="0"/>
                 <a:cs typeface="Consolas" charset="0"/>
               </a:rPr>
-              <a:t>GET /</a:t>
-            </a:r>
-            <a:r>
-              <a:rPr lang="en-US" sz="2800" dirty="0" err="1">
-                <a:latin typeface="Consolas" charset="0"/>
-                <a:ea typeface="Consolas" charset="0"/>
-                <a:cs typeface="Consolas" charset="0"/>
-              </a:rPr>
-              <a:t>index.html</a:t>
-            </a:r>
-            <a:r>
-              <a:rPr lang="en-US" sz="2800" dirty="0">
-                <a:latin typeface="Consolas" charset="0"/>
-                <a:ea typeface="Consolas" charset="0"/>
-                <a:cs typeface="Consolas" charset="0"/>
-              </a:rPr>
-              <a:t> HTTP/1.1</a:t>
+              <a:t>GET /index.html HTTP/1.1</a:t>
             </a:r>
             <a:br>
               <a:rPr lang="en-US" sz="2800" dirty="0">
@@ -6704,15 +6735,7 @@
                 <a:ea typeface="Consolas" charset="0"/>
                 <a:cs typeface="Consolas" charset="0"/>
               </a:rPr>
-              <a:t>Host: </a:t>
-            </a:r>
-            <a:r>
-              <a:rPr lang="en-US" sz="2800" dirty="0" err="1">
-                <a:latin typeface="Consolas" charset="0"/>
-                <a:ea typeface="Consolas" charset="0"/>
-                <a:cs typeface="Consolas" charset="0"/>
-              </a:rPr>
-              <a:t>www.example.com</a:t>
+              <a:t>Host: www.example.com</a:t>
             </a:r>
             <a:br>
               <a:rPr lang="en-US" sz="2800" dirty="0">

</xml_diff>